<commit_message>
Update Final_PPT_Team_2(Body Signal of Smoking).pptx
</commit_message>
<xml_diff>
--- a/Final_PPT_Team_2(Body Signal of Smoking).pptx
+++ b/Final_PPT_Team_2(Body Signal of Smoking).pptx
@@ -29219,14 +29219,14 @@
           <p:nvPr>
             <p:extLst>
               <p:ext uri="{D42A27DB-BD31-4B8C-83A1-F6EECF244321}">
-                <p14:modId xmlns:p14="http://schemas.microsoft.com/office/powerpoint/2010/main" val="1663798758"/>
+                <p14:modId xmlns:p14="http://schemas.microsoft.com/office/powerpoint/2010/main" val="2401491958"/>
               </p:ext>
             </p:extLst>
           </p:nvPr>
         </p:nvGraphicFramePr>
         <p:xfrm>
           <a:off x="1609679" y="1374140"/>
-          <a:ext cx="6096000" cy="3103880"/>
+          <a:ext cx="6096000" cy="2890520"/>
         </p:xfrm>
         <a:graphic>
           <a:graphicData uri="http://schemas.openxmlformats.org/drawingml/2006/table">
@@ -29283,16 +29283,11 @@
                           <a:solidFill>
                             <a:schemeClr val="tx1"/>
                           </a:solidFill>
+                          <a:latin typeface="Calibri" panose="020F0502020204030204" pitchFamily="34" charset="0"/>
+                          <a:cs typeface="Calibri" panose="020F0502020204030204" pitchFamily="34" charset="0"/>
                         </a:rPr>
                         <a:t>Models</a:t>
                       </a:r>
-                      <a:endParaRPr lang="en-US" dirty="0">
-                        <a:solidFill>
-                          <a:schemeClr val="tx1"/>
-                        </a:solidFill>
-                        <a:latin typeface="Calibri" panose="020F0502020204030204" pitchFamily="34" charset="0"/>
-                        <a:cs typeface="Calibri" panose="020F0502020204030204" pitchFamily="34" charset="0"/>
-                      </a:endParaRPr>
                     </a:p>
                   </a:txBody>
                   <a:tcPr/>
@@ -29308,16 +29303,11 @@
                           <a:solidFill>
                             <a:schemeClr val="tx1"/>
                           </a:solidFill>
+                          <a:latin typeface="Calibri" panose="020F0502020204030204" pitchFamily="34" charset="0"/>
+                          <a:cs typeface="Calibri" panose="020F0502020204030204" pitchFamily="34" charset="0"/>
                         </a:rPr>
                         <a:t>Accuracy</a:t>
                       </a:r>
-                      <a:endParaRPr lang="en-US" dirty="0">
-                        <a:solidFill>
-                          <a:schemeClr val="tx1"/>
-                        </a:solidFill>
-                        <a:latin typeface="Calibri" panose="020F0502020204030204" pitchFamily="34" charset="0"/>
-                        <a:cs typeface="Calibri" panose="020F0502020204030204" pitchFamily="34" charset="0"/>
-                      </a:endParaRPr>
                     </a:p>
                   </a:txBody>
                   <a:tcPr/>
@@ -29333,16 +29323,11 @@
                           <a:solidFill>
                             <a:schemeClr val="tx1"/>
                           </a:solidFill>
+                          <a:latin typeface="Calibri" panose="020F0502020204030204" pitchFamily="34" charset="0"/>
+                          <a:cs typeface="Calibri" panose="020F0502020204030204" pitchFamily="34" charset="0"/>
                         </a:rPr>
                         <a:t>Precision</a:t>
                       </a:r>
-                      <a:endParaRPr lang="en-US" dirty="0">
-                        <a:solidFill>
-                          <a:schemeClr val="tx1"/>
-                        </a:solidFill>
-                        <a:latin typeface="Calibri" panose="020F0502020204030204" pitchFamily="34" charset="0"/>
-                        <a:cs typeface="Calibri" panose="020F0502020204030204" pitchFamily="34" charset="0"/>
-                      </a:endParaRPr>
                     </a:p>
                   </a:txBody>
                   <a:tcPr/>
@@ -29358,16 +29343,11 @@
                           <a:solidFill>
                             <a:schemeClr val="tx1"/>
                           </a:solidFill>
+                          <a:latin typeface="Calibri" panose="020F0502020204030204" pitchFamily="34" charset="0"/>
+                          <a:cs typeface="Calibri" panose="020F0502020204030204" pitchFamily="34" charset="0"/>
                         </a:rPr>
                         <a:t>Recall</a:t>
                       </a:r>
-                      <a:endParaRPr lang="en-US" dirty="0">
-                        <a:solidFill>
-                          <a:schemeClr val="tx1"/>
-                        </a:solidFill>
-                        <a:latin typeface="Calibri" panose="020F0502020204030204" pitchFamily="34" charset="0"/>
-                        <a:cs typeface="Calibri" panose="020F0502020204030204" pitchFamily="34" charset="0"/>
-                      </a:endParaRPr>
                     </a:p>
                   </a:txBody>
                   <a:tcPr/>
@@ -29383,16 +29363,11 @@
                           <a:solidFill>
                             <a:schemeClr val="tx1"/>
                           </a:solidFill>
+                          <a:latin typeface="Calibri" panose="020F0502020204030204" pitchFamily="34" charset="0"/>
+                          <a:cs typeface="Calibri" panose="020F0502020204030204" pitchFamily="34" charset="0"/>
                         </a:rPr>
                         <a:t>AUC</a:t>
                       </a:r>
-                      <a:endParaRPr lang="en-US" dirty="0">
-                        <a:solidFill>
-                          <a:schemeClr val="tx1"/>
-                        </a:solidFill>
-                        <a:latin typeface="Calibri" panose="020F0502020204030204" pitchFamily="34" charset="0"/>
-                        <a:cs typeface="Calibri" panose="020F0502020204030204" pitchFamily="34" charset="0"/>
-                      </a:endParaRPr>
                     </a:p>
                   </a:txBody>
                   <a:tcPr/>
@@ -29415,6 +29390,8 @@
                           <a:solidFill>
                             <a:schemeClr val="tx1"/>
                           </a:solidFill>
+                          <a:latin typeface="Calibri" panose="020F0502020204030204" pitchFamily="34" charset="0"/>
+                          <a:cs typeface="Calibri" panose="020F0502020204030204" pitchFamily="34" charset="0"/>
                         </a:rPr>
                         <a:t>Logistic</a:t>
                       </a:r>
@@ -29423,6 +29400,8 @@
                           <a:solidFill>
                             <a:schemeClr val="tx1"/>
                           </a:solidFill>
+                          <a:latin typeface="Calibri" panose="020F0502020204030204" pitchFamily="34" charset="0"/>
+                          <a:cs typeface="Calibri" panose="020F0502020204030204" pitchFamily="34" charset="0"/>
                         </a:rPr>
                         <a:t> Regression</a:t>
                       </a:r>
@@ -29448,16 +29427,11 @@
                           <a:solidFill>
                             <a:schemeClr val="tx1"/>
                           </a:solidFill>
+                          <a:latin typeface="Calibri" panose="020F0502020204030204" pitchFamily="34" charset="0"/>
+                          <a:cs typeface="Calibri" panose="020F0502020204030204" pitchFamily="34" charset="0"/>
                         </a:rPr>
                         <a:t>0.72</a:t>
                       </a:r>
-                      <a:endParaRPr lang="en-US" dirty="0">
-                        <a:solidFill>
-                          <a:schemeClr val="tx1"/>
-                        </a:solidFill>
-                        <a:latin typeface="Calibri" panose="020F0502020204030204" pitchFamily="34" charset="0"/>
-                        <a:cs typeface="Calibri" panose="020F0502020204030204" pitchFamily="34" charset="0"/>
-                      </a:endParaRPr>
                     </a:p>
                   </a:txBody>
                   <a:tcPr/>
@@ -29473,16 +29447,11 @@
                           <a:solidFill>
                             <a:schemeClr val="tx1"/>
                           </a:solidFill>
+                          <a:latin typeface="Calibri" panose="020F0502020204030204" pitchFamily="34" charset="0"/>
+                          <a:cs typeface="Calibri" panose="020F0502020204030204" pitchFamily="34" charset="0"/>
                         </a:rPr>
                         <a:t>0.75</a:t>
                       </a:r>
-                      <a:endParaRPr lang="en-US" dirty="0">
-                        <a:solidFill>
-                          <a:schemeClr val="tx1"/>
-                        </a:solidFill>
-                        <a:latin typeface="Calibri" panose="020F0502020204030204" pitchFamily="34" charset="0"/>
-                        <a:cs typeface="Calibri" panose="020F0502020204030204" pitchFamily="34" charset="0"/>
-                      </a:endParaRPr>
                     </a:p>
                   </a:txBody>
                   <a:tcPr/>
@@ -29498,16 +29467,11 @@
                           <a:solidFill>
                             <a:schemeClr val="tx1"/>
                           </a:solidFill>
+                          <a:latin typeface="Calibri" panose="020F0502020204030204" pitchFamily="34" charset="0"/>
+                          <a:cs typeface="Calibri" panose="020F0502020204030204" pitchFamily="34" charset="0"/>
                         </a:rPr>
                         <a:t>0.72</a:t>
                       </a:r>
-                      <a:endParaRPr lang="en-US" dirty="0">
-                        <a:solidFill>
-                          <a:schemeClr val="tx1"/>
-                        </a:solidFill>
-                        <a:latin typeface="Calibri" panose="020F0502020204030204" pitchFamily="34" charset="0"/>
-                        <a:cs typeface="Calibri" panose="020F0502020204030204" pitchFamily="34" charset="0"/>
-                      </a:endParaRPr>
                     </a:p>
                   </a:txBody>
                   <a:tcPr/>
@@ -29523,16 +29487,11 @@
                           <a:solidFill>
                             <a:schemeClr val="tx1"/>
                           </a:solidFill>
+                          <a:latin typeface="Calibri" panose="020F0502020204030204" pitchFamily="34" charset="0"/>
+                          <a:cs typeface="Calibri" panose="020F0502020204030204" pitchFamily="34" charset="0"/>
                         </a:rPr>
                         <a:t>0.80</a:t>
                       </a:r>
-                      <a:endParaRPr lang="en-US" dirty="0">
-                        <a:solidFill>
-                          <a:schemeClr val="tx1"/>
-                        </a:solidFill>
-                        <a:latin typeface="Calibri" panose="020F0502020204030204" pitchFamily="34" charset="0"/>
-                        <a:cs typeface="Calibri" panose="020F0502020204030204" pitchFamily="34" charset="0"/>
-                      </a:endParaRPr>
                     </a:p>
                   </a:txBody>
                   <a:tcPr/>
@@ -29555,16 +29514,11 @@
                           <a:solidFill>
                             <a:schemeClr val="tx1"/>
                           </a:solidFill>
+                          <a:latin typeface="Calibri" panose="020F0502020204030204" pitchFamily="34" charset="0"/>
+                          <a:cs typeface="Calibri" panose="020F0502020204030204" pitchFamily="34" charset="0"/>
                         </a:rPr>
                         <a:t>Decision Tree</a:t>
                       </a:r>
-                      <a:endParaRPr lang="en-US" dirty="0">
-                        <a:solidFill>
-                          <a:schemeClr val="tx1"/>
-                        </a:solidFill>
-                        <a:latin typeface="Calibri" panose="020F0502020204030204" pitchFamily="34" charset="0"/>
-                        <a:cs typeface="Calibri" panose="020F0502020204030204" pitchFamily="34" charset="0"/>
-                      </a:endParaRPr>
                     </a:p>
                   </a:txBody>
                   <a:tcPr/>
@@ -29580,16 +29534,11 @@
                           <a:solidFill>
                             <a:schemeClr val="tx1"/>
                           </a:solidFill>
+                          <a:latin typeface="Calibri" panose="020F0502020204030204" pitchFamily="34" charset="0"/>
+                          <a:cs typeface="Calibri" panose="020F0502020204030204" pitchFamily="34" charset="0"/>
                         </a:rPr>
                         <a:t>0.77</a:t>
                       </a:r>
-                      <a:endParaRPr lang="en-US" dirty="0">
-                        <a:solidFill>
-                          <a:schemeClr val="tx1"/>
-                        </a:solidFill>
-                        <a:latin typeface="Calibri" panose="020F0502020204030204" pitchFamily="34" charset="0"/>
-                        <a:cs typeface="Calibri" panose="020F0502020204030204" pitchFamily="34" charset="0"/>
-                      </a:endParaRPr>
                     </a:p>
                   </a:txBody>
                   <a:tcPr/>
@@ -29605,16 +29554,11 @@
                           <a:solidFill>
                             <a:schemeClr val="tx1"/>
                           </a:solidFill>
+                          <a:latin typeface="Calibri" panose="020F0502020204030204" pitchFamily="34" charset="0"/>
+                          <a:cs typeface="Calibri" panose="020F0502020204030204" pitchFamily="34" charset="0"/>
                         </a:rPr>
                         <a:t>0.78</a:t>
                       </a:r>
-                      <a:endParaRPr lang="en-US" dirty="0">
-                        <a:solidFill>
-                          <a:schemeClr val="tx1"/>
-                        </a:solidFill>
-                        <a:latin typeface="Calibri" panose="020F0502020204030204" pitchFamily="34" charset="0"/>
-                        <a:cs typeface="Calibri" panose="020F0502020204030204" pitchFamily="34" charset="0"/>
-                      </a:endParaRPr>
                     </a:p>
                   </a:txBody>
                   <a:tcPr/>
@@ -29630,16 +29574,11 @@
                           <a:solidFill>
                             <a:schemeClr val="tx1"/>
                           </a:solidFill>
+                          <a:latin typeface="Calibri" panose="020F0502020204030204" pitchFamily="34" charset="0"/>
+                          <a:cs typeface="Calibri" panose="020F0502020204030204" pitchFamily="34" charset="0"/>
                         </a:rPr>
                         <a:t>0.77</a:t>
                       </a:r>
-                      <a:endParaRPr lang="en-US" dirty="0">
-                        <a:solidFill>
-                          <a:schemeClr val="tx1"/>
-                        </a:solidFill>
-                        <a:latin typeface="Calibri" panose="020F0502020204030204" pitchFamily="34" charset="0"/>
-                        <a:cs typeface="Calibri" panose="020F0502020204030204" pitchFamily="34" charset="0"/>
-                      </a:endParaRPr>
                     </a:p>
                   </a:txBody>
                   <a:tcPr/>
@@ -29655,16 +29594,11 @@
                           <a:solidFill>
                             <a:schemeClr val="tx1"/>
                           </a:solidFill>
+                          <a:latin typeface="Calibri" panose="020F0502020204030204" pitchFamily="34" charset="0"/>
+                          <a:cs typeface="Calibri" panose="020F0502020204030204" pitchFamily="34" charset="0"/>
                         </a:rPr>
                         <a:t>0.76</a:t>
                       </a:r>
-                      <a:endParaRPr lang="en-US" dirty="0">
-                        <a:solidFill>
-                          <a:schemeClr val="tx1"/>
-                        </a:solidFill>
-                        <a:latin typeface="Calibri" panose="020F0502020204030204" pitchFamily="34" charset="0"/>
-                        <a:cs typeface="Calibri" panose="020F0502020204030204" pitchFamily="34" charset="0"/>
-                      </a:endParaRPr>
                     </a:p>
                   </a:txBody>
                   <a:tcPr/>
@@ -29687,16 +29621,11 @@
                           <a:solidFill>
                             <a:schemeClr val="tx1"/>
                           </a:solidFill>
+                          <a:latin typeface="Calibri" panose="020F0502020204030204" pitchFamily="34" charset="0"/>
+                          <a:cs typeface="Calibri" panose="020F0502020204030204" pitchFamily="34" charset="0"/>
                         </a:rPr>
                         <a:t>Random Forest</a:t>
                       </a:r>
-                      <a:endParaRPr lang="en-US" dirty="0">
-                        <a:solidFill>
-                          <a:schemeClr val="tx1"/>
-                        </a:solidFill>
-                        <a:latin typeface="Calibri" panose="020F0502020204030204" pitchFamily="34" charset="0"/>
-                        <a:cs typeface="Calibri" panose="020F0502020204030204" pitchFamily="34" charset="0"/>
-                      </a:endParaRPr>
                     </a:p>
                   </a:txBody>
                   <a:tcPr/>
@@ -29712,16 +29641,11 @@
                           <a:solidFill>
                             <a:schemeClr val="tx1"/>
                           </a:solidFill>
+                          <a:latin typeface="Calibri" panose="020F0502020204030204" pitchFamily="34" charset="0"/>
+                          <a:cs typeface="Calibri" panose="020F0502020204030204" pitchFamily="34" charset="0"/>
                         </a:rPr>
                         <a:t>0.82</a:t>
                       </a:r>
-                      <a:endParaRPr lang="en-US" dirty="0">
-                        <a:solidFill>
-                          <a:schemeClr val="tx1"/>
-                        </a:solidFill>
-                        <a:latin typeface="Calibri" panose="020F0502020204030204" pitchFamily="34" charset="0"/>
-                        <a:cs typeface="Calibri" panose="020F0502020204030204" pitchFamily="34" charset="0"/>
-                      </a:endParaRPr>
                     </a:p>
                   </a:txBody>
                   <a:tcPr/>
@@ -29737,16 +29661,11 @@
                           <a:solidFill>
                             <a:schemeClr val="tx1"/>
                           </a:solidFill>
+                          <a:latin typeface="Calibri" panose="020F0502020204030204" pitchFamily="34" charset="0"/>
+                          <a:cs typeface="Calibri" panose="020F0502020204030204" pitchFamily="34" charset="0"/>
                         </a:rPr>
                         <a:t>0.83</a:t>
                       </a:r>
-                      <a:endParaRPr lang="en-US" dirty="0">
-                        <a:solidFill>
-                          <a:schemeClr val="tx1"/>
-                        </a:solidFill>
-                        <a:latin typeface="Calibri" panose="020F0502020204030204" pitchFamily="34" charset="0"/>
-                        <a:cs typeface="Calibri" panose="020F0502020204030204" pitchFamily="34" charset="0"/>
-                      </a:endParaRPr>
                     </a:p>
                   </a:txBody>
                   <a:tcPr/>
@@ -29762,16 +29681,11 @@
                           <a:solidFill>
                             <a:schemeClr val="tx1"/>
                           </a:solidFill>
+                          <a:latin typeface="Calibri" panose="020F0502020204030204" pitchFamily="34" charset="0"/>
+                          <a:cs typeface="Calibri" panose="020F0502020204030204" pitchFamily="34" charset="0"/>
                         </a:rPr>
                         <a:t>0.82</a:t>
                       </a:r>
-                      <a:endParaRPr lang="en-US" dirty="0">
-                        <a:solidFill>
-                          <a:schemeClr val="tx1"/>
-                        </a:solidFill>
-                        <a:latin typeface="Calibri" panose="020F0502020204030204" pitchFamily="34" charset="0"/>
-                        <a:cs typeface="Calibri" panose="020F0502020204030204" pitchFamily="34" charset="0"/>
-                      </a:endParaRPr>
                     </a:p>
                   </a:txBody>
                   <a:tcPr/>
@@ -29787,16 +29701,11 @@
                           <a:solidFill>
                             <a:schemeClr val="tx1"/>
                           </a:solidFill>
+                          <a:latin typeface="Calibri" panose="020F0502020204030204" pitchFamily="34" charset="0"/>
+                          <a:cs typeface="Calibri" panose="020F0502020204030204" pitchFamily="34" charset="0"/>
                         </a:rPr>
                         <a:t>0.91</a:t>
                       </a:r>
-                      <a:endParaRPr lang="en-US" dirty="0">
-                        <a:solidFill>
-                          <a:schemeClr val="tx1"/>
-                        </a:solidFill>
-                        <a:latin typeface="Calibri" panose="020F0502020204030204" pitchFamily="34" charset="0"/>
-                        <a:cs typeface="Calibri" panose="020F0502020204030204" pitchFamily="34" charset="0"/>
-                      </a:endParaRPr>
                     </a:p>
                   </a:txBody>
                   <a:tcPr/>
@@ -29837,16 +29746,11 @@
                           <a:solidFill>
                             <a:schemeClr val="tx1"/>
                           </a:solidFill>
+                          <a:latin typeface="Calibri" panose="020F0502020204030204" pitchFamily="34" charset="0"/>
+                          <a:cs typeface="Calibri" panose="020F0502020204030204" pitchFamily="34" charset="0"/>
                         </a:rPr>
                         <a:t>Random Forest(With Feature Selection)</a:t>
                       </a:r>
-                      <a:endParaRPr lang="en-US" dirty="0">
-                        <a:solidFill>
-                          <a:schemeClr val="tx1"/>
-                        </a:solidFill>
-                        <a:latin typeface="Calibri" panose="020F0502020204030204" pitchFamily="34" charset="0"/>
-                        <a:cs typeface="Calibri" panose="020F0502020204030204" pitchFamily="34" charset="0"/>
-                      </a:endParaRPr>
                     </a:p>
                   </a:txBody>
                   <a:tcPr/>
@@ -29862,16 +29766,11 @@
                           <a:solidFill>
                             <a:srgbClr val="00B050"/>
                           </a:solidFill>
+                          <a:latin typeface="Calibri" panose="020F0502020204030204" pitchFamily="34" charset="0"/>
+                          <a:cs typeface="Calibri" panose="020F0502020204030204" pitchFamily="34" charset="0"/>
                         </a:rPr>
                         <a:t>0.82</a:t>
                       </a:r>
-                      <a:endParaRPr lang="en-US" dirty="0">
-                        <a:solidFill>
-                          <a:srgbClr val="00B050"/>
-                        </a:solidFill>
-                        <a:latin typeface="Calibri" panose="020F0502020204030204" pitchFamily="34" charset="0"/>
-                        <a:cs typeface="Calibri" panose="020F0502020204030204" pitchFamily="34" charset="0"/>
-                      </a:endParaRPr>
                     </a:p>
                   </a:txBody>
                   <a:tcPr/>
@@ -29887,16 +29786,11 @@
                           <a:solidFill>
                             <a:srgbClr val="00B050"/>
                           </a:solidFill>
+                          <a:latin typeface="Calibri" panose="020F0502020204030204" pitchFamily="34" charset="0"/>
+                          <a:cs typeface="Calibri" panose="020F0502020204030204" pitchFamily="34" charset="0"/>
                         </a:rPr>
                         <a:t>0.82</a:t>
                       </a:r>
-                      <a:endParaRPr lang="en-US" dirty="0">
-                        <a:solidFill>
-                          <a:srgbClr val="00B050"/>
-                        </a:solidFill>
-                        <a:latin typeface="Calibri" panose="020F0502020204030204" pitchFamily="34" charset="0"/>
-                        <a:cs typeface="Calibri" panose="020F0502020204030204" pitchFamily="34" charset="0"/>
-                      </a:endParaRPr>
                     </a:p>
                   </a:txBody>
                   <a:tcPr/>
@@ -29912,16 +29806,11 @@
                           <a:solidFill>
                             <a:srgbClr val="00B050"/>
                           </a:solidFill>
+                          <a:latin typeface="Calibri" panose="020F0502020204030204" pitchFamily="34" charset="0"/>
+                          <a:cs typeface="Calibri" panose="020F0502020204030204" pitchFamily="34" charset="0"/>
                         </a:rPr>
                         <a:t>0.82</a:t>
                       </a:r>
-                      <a:endParaRPr lang="en-US" dirty="0">
-                        <a:solidFill>
-                          <a:srgbClr val="00B050"/>
-                        </a:solidFill>
-                        <a:latin typeface="Calibri" panose="020F0502020204030204" pitchFamily="34" charset="0"/>
-                        <a:cs typeface="Calibri" panose="020F0502020204030204" pitchFamily="34" charset="0"/>
-                      </a:endParaRPr>
                     </a:p>
                   </a:txBody>
                   <a:tcPr/>
@@ -29937,16 +29826,11 @@
                           <a:solidFill>
                             <a:srgbClr val="00B050"/>
                           </a:solidFill>
+                          <a:latin typeface="Calibri" panose="020F0502020204030204" pitchFamily="34" charset="0"/>
+                          <a:cs typeface="Calibri" panose="020F0502020204030204" pitchFamily="34" charset="0"/>
                         </a:rPr>
                         <a:t>0.90</a:t>
                       </a:r>
-                      <a:endParaRPr lang="en-US" dirty="0">
-                        <a:solidFill>
-                          <a:srgbClr val="00B050"/>
-                        </a:solidFill>
-                        <a:latin typeface="Calibri" panose="020F0502020204030204" pitchFamily="34" charset="0"/>
-                        <a:cs typeface="Calibri" panose="020F0502020204030204" pitchFamily="34" charset="0"/>
-                      </a:endParaRPr>
                     </a:p>
                   </a:txBody>
                   <a:tcPr/>
@@ -29987,6 +29871,8 @@
                           <a:solidFill>
                             <a:schemeClr val="tx1"/>
                           </a:solidFill>
+                          <a:latin typeface="Calibri" panose="020F0502020204030204" pitchFamily="34" charset="0"/>
+                          <a:cs typeface="Calibri" panose="020F0502020204030204" pitchFamily="34" charset="0"/>
                         </a:rPr>
                         <a:t>Random Forest(With Scaling)</a:t>
                       </a:r>
@@ -30012,16 +29898,11 @@
                           <a:solidFill>
                             <a:schemeClr val="tx1"/>
                           </a:solidFill>
+                          <a:latin typeface="Calibri" panose="020F0502020204030204" pitchFamily="34" charset="0"/>
+                          <a:cs typeface="Calibri" panose="020F0502020204030204" pitchFamily="34" charset="0"/>
                         </a:rPr>
                         <a:t>0.82</a:t>
                       </a:r>
-                      <a:endParaRPr lang="en-US" dirty="0">
-                        <a:solidFill>
-                          <a:schemeClr val="tx1"/>
-                        </a:solidFill>
-                        <a:latin typeface="Calibri" panose="020F0502020204030204" pitchFamily="34" charset="0"/>
-                        <a:cs typeface="Calibri" panose="020F0502020204030204" pitchFamily="34" charset="0"/>
-                      </a:endParaRPr>
                     </a:p>
                   </a:txBody>
                   <a:tcPr/>
@@ -30037,16 +29918,11 @@
                           <a:solidFill>
                             <a:schemeClr val="tx1"/>
                           </a:solidFill>
+                          <a:latin typeface="Calibri" panose="020F0502020204030204" pitchFamily="34" charset="0"/>
+                          <a:cs typeface="Calibri" panose="020F0502020204030204" pitchFamily="34" charset="0"/>
                         </a:rPr>
                         <a:t>0.83</a:t>
                       </a:r>
-                      <a:endParaRPr lang="en-US" dirty="0">
-                        <a:solidFill>
-                          <a:schemeClr val="tx1"/>
-                        </a:solidFill>
-                        <a:latin typeface="Calibri" panose="020F0502020204030204" pitchFamily="34" charset="0"/>
-                        <a:cs typeface="Calibri" panose="020F0502020204030204" pitchFamily="34" charset="0"/>
-                      </a:endParaRPr>
                     </a:p>
                   </a:txBody>
                   <a:tcPr/>
@@ -30062,16 +29938,11 @@
                           <a:solidFill>
                             <a:schemeClr val="tx1"/>
                           </a:solidFill>
+                          <a:latin typeface="Calibri" panose="020F0502020204030204" pitchFamily="34" charset="0"/>
+                          <a:cs typeface="Calibri" panose="020F0502020204030204" pitchFamily="34" charset="0"/>
                         </a:rPr>
                         <a:t>0.82</a:t>
                       </a:r>
-                      <a:endParaRPr lang="en-US" dirty="0">
-                        <a:solidFill>
-                          <a:schemeClr val="tx1"/>
-                        </a:solidFill>
-                        <a:latin typeface="Calibri" panose="020F0502020204030204" pitchFamily="34" charset="0"/>
-                        <a:cs typeface="Calibri" panose="020F0502020204030204" pitchFamily="34" charset="0"/>
-                      </a:endParaRPr>
                     </a:p>
                   </a:txBody>
                   <a:tcPr/>
@@ -30087,16 +29958,11 @@
                           <a:solidFill>
                             <a:schemeClr val="tx1"/>
                           </a:solidFill>
+                          <a:latin typeface="Calibri" panose="020F0502020204030204" pitchFamily="34" charset="0"/>
+                          <a:cs typeface="Calibri" panose="020F0502020204030204" pitchFamily="34" charset="0"/>
                         </a:rPr>
                         <a:t>0.90</a:t>
                       </a:r>
-                      <a:endParaRPr lang="en-US" dirty="0">
-                        <a:solidFill>
-                          <a:schemeClr val="tx1"/>
-                        </a:solidFill>
-                        <a:latin typeface="Calibri" panose="020F0502020204030204" pitchFamily="34" charset="0"/>
-                        <a:cs typeface="Calibri" panose="020F0502020204030204" pitchFamily="34" charset="0"/>
-                      </a:endParaRPr>
                     </a:p>
                   </a:txBody>
                   <a:tcPr/>
@@ -30119,16 +29985,11 @@
                           <a:solidFill>
                             <a:schemeClr val="tx1"/>
                           </a:solidFill>
+                          <a:latin typeface="Calibri" panose="020F0502020204030204" pitchFamily="34" charset="0"/>
+                          <a:cs typeface="Calibri" panose="020F0502020204030204" pitchFamily="34" charset="0"/>
                         </a:rPr>
                         <a:t>KNN</a:t>
                       </a:r>
-                      <a:endParaRPr lang="en-US" dirty="0">
-                        <a:solidFill>
-                          <a:schemeClr val="tx1"/>
-                        </a:solidFill>
-                        <a:latin typeface="Calibri" panose="020F0502020204030204" pitchFamily="34" charset="0"/>
-                        <a:cs typeface="Calibri" panose="020F0502020204030204" pitchFamily="34" charset="0"/>
-                      </a:endParaRPr>
                     </a:p>
                   </a:txBody>
                   <a:tcPr/>
@@ -30144,16 +30005,11 @@
                           <a:solidFill>
                             <a:schemeClr val="tx1"/>
                           </a:solidFill>
+                          <a:latin typeface="Calibri" panose="020F0502020204030204" pitchFamily="34" charset="0"/>
+                          <a:cs typeface="Calibri" panose="020F0502020204030204" pitchFamily="34" charset="0"/>
                         </a:rPr>
                         <a:t>0.75</a:t>
                       </a:r>
-                      <a:endParaRPr lang="en-US" dirty="0">
-                        <a:solidFill>
-                          <a:schemeClr val="tx1"/>
-                        </a:solidFill>
-                        <a:latin typeface="Calibri" panose="020F0502020204030204" pitchFamily="34" charset="0"/>
-                        <a:cs typeface="Calibri" panose="020F0502020204030204" pitchFamily="34" charset="0"/>
-                      </a:endParaRPr>
                     </a:p>
                   </a:txBody>
                   <a:tcPr/>
@@ -30169,16 +30025,11 @@
                           <a:solidFill>
                             <a:schemeClr val="tx1"/>
                           </a:solidFill>
+                          <a:latin typeface="Calibri" panose="020F0502020204030204" pitchFamily="34" charset="0"/>
+                          <a:cs typeface="Calibri" panose="020F0502020204030204" pitchFamily="34" charset="0"/>
                         </a:rPr>
                         <a:t>0.74</a:t>
                       </a:r>
-                      <a:endParaRPr lang="en-US" dirty="0">
-                        <a:solidFill>
-                          <a:schemeClr val="tx1"/>
-                        </a:solidFill>
-                        <a:latin typeface="Calibri" panose="020F0502020204030204" pitchFamily="34" charset="0"/>
-                        <a:cs typeface="Calibri" panose="020F0502020204030204" pitchFamily="34" charset="0"/>
-                      </a:endParaRPr>
                     </a:p>
                   </a:txBody>
                   <a:tcPr/>
@@ -30194,16 +30045,11 @@
                           <a:solidFill>
                             <a:schemeClr val="tx1"/>
                           </a:solidFill>
+                          <a:latin typeface="Calibri" panose="020F0502020204030204" pitchFamily="34" charset="0"/>
+                          <a:cs typeface="Calibri" panose="020F0502020204030204" pitchFamily="34" charset="0"/>
                         </a:rPr>
                         <a:t>0.75</a:t>
                       </a:r>
-                      <a:endParaRPr lang="en-US" dirty="0">
-                        <a:solidFill>
-                          <a:schemeClr val="tx1"/>
-                        </a:solidFill>
-                        <a:latin typeface="Calibri" panose="020F0502020204030204" pitchFamily="34" charset="0"/>
-                        <a:cs typeface="Calibri" panose="020F0502020204030204" pitchFamily="34" charset="0"/>
-                      </a:endParaRPr>
                     </a:p>
                   </a:txBody>
                   <a:tcPr/>
@@ -30219,16 +30065,11 @@
                           <a:solidFill>
                             <a:schemeClr val="tx1"/>
                           </a:solidFill>
+                          <a:latin typeface="Calibri" panose="020F0502020204030204" pitchFamily="34" charset="0"/>
+                          <a:cs typeface="Calibri" panose="020F0502020204030204" pitchFamily="34" charset="0"/>
                         </a:rPr>
                         <a:t>0.81</a:t>
                       </a:r>
-                      <a:endParaRPr lang="en-US" dirty="0">
-                        <a:solidFill>
-                          <a:schemeClr val="tx1"/>
-                        </a:solidFill>
-                        <a:latin typeface="Calibri" panose="020F0502020204030204" pitchFamily="34" charset="0"/>
-                        <a:cs typeface="Calibri" panose="020F0502020204030204" pitchFamily="34" charset="0"/>
-                      </a:endParaRPr>
                     </a:p>
                   </a:txBody>
                   <a:tcPr/>

</xml_diff>